<commit_message>
Updated screenshots in english for balloonPop
</commit_message>
<xml_diff>
--- a/scratch-leapmotion/instructions/en/Balloon Pop.pptx
+++ b/scratch-leapmotion/instructions/en/Balloon Pop.pptx
@@ -72,7 +72,7 @@
         <p:spPr>
           <a:xfrm>
             <a:off x="457200" y="274680"/>
-            <a:ext cx="8228160" cy="1143000"/>
+            <a:ext cx="8227800" cy="1143000"/>
           </a:xfrm>
           <a:prstGeom prst="rect">
             <a:avLst/>
@@ -99,7 +99,7 @@
         <p:spPr>
           <a:xfrm>
             <a:off x="457200" y="1600200"/>
-            <a:ext cx="955440" cy="2157840"/>
+            <a:ext cx="465840" cy="2157840"/>
           </a:xfrm>
           <a:prstGeom prst="rect">
             <a:avLst/>
@@ -125,7 +125,7 @@
         <p:spPr>
           <a:xfrm>
             <a:off x="457200" y="3963600"/>
-            <a:ext cx="955440" cy="2157840"/>
+            <a:ext cx="465840" cy="2157840"/>
           </a:xfrm>
           <a:prstGeom prst="rect">
             <a:avLst/>
@@ -173,7 +173,7 @@
         <p:spPr>
           <a:xfrm>
             <a:off x="457200" y="274680"/>
-            <a:ext cx="8228160" cy="1143000"/>
+            <a:ext cx="8227800" cy="1143000"/>
           </a:xfrm>
           <a:prstGeom prst="rect">
             <a:avLst/>
@@ -200,7 +200,7 @@
         <p:spPr>
           <a:xfrm>
             <a:off x="457200" y="1600200"/>
-            <a:ext cx="466200" cy="2157840"/>
+            <a:ext cx="227160" cy="2157840"/>
           </a:xfrm>
           <a:prstGeom prst="rect">
             <a:avLst/>
@@ -225,8 +225,8 @@
         </p:nvSpPr>
         <p:spPr>
           <a:xfrm>
-            <a:off x="947160" y="1600200"/>
-            <a:ext cx="466200" cy="2157840"/>
+            <a:off x="696240" y="1600200"/>
+            <a:ext cx="227160" cy="2157840"/>
           </a:xfrm>
           <a:prstGeom prst="rect">
             <a:avLst/>
@@ -251,8 +251,8 @@
         </p:nvSpPr>
         <p:spPr>
           <a:xfrm>
-            <a:off x="947160" y="3963600"/>
-            <a:ext cx="466200" cy="2157840"/>
+            <a:off x="696240" y="3963600"/>
+            <a:ext cx="227160" cy="2157840"/>
           </a:xfrm>
           <a:prstGeom prst="rect">
             <a:avLst/>
@@ -278,7 +278,7 @@
         <p:spPr>
           <a:xfrm>
             <a:off x="457200" y="3963600"/>
-            <a:ext cx="466200" cy="2157840"/>
+            <a:ext cx="227160" cy="2157840"/>
           </a:xfrm>
           <a:prstGeom prst="rect">
             <a:avLst/>
@@ -326,7 +326,7 @@
         <p:spPr>
           <a:xfrm>
             <a:off x="457200" y="274680"/>
-            <a:ext cx="8228160" cy="1143000"/>
+            <a:ext cx="8227800" cy="1143000"/>
           </a:xfrm>
           <a:prstGeom prst="rect">
             <a:avLst/>
@@ -353,7 +353,7 @@
         <p:spPr>
           <a:xfrm>
             <a:off x="457200" y="1600200"/>
-            <a:ext cx="955440" cy="4524480"/>
+            <a:ext cx="465840" cy="4524120"/>
           </a:xfrm>
           <a:prstGeom prst="rect">
             <a:avLst/>
@@ -379,7 +379,7 @@
         <p:spPr>
           <a:xfrm>
             <a:off x="457200" y="1600200"/>
-            <a:ext cx="955440" cy="4524480"/>
+            <a:ext cx="465840" cy="4524120"/>
           </a:xfrm>
           <a:prstGeom prst="rect">
             <a:avLst/>
@@ -406,8 +406,8 @@
         </p:blipFill>
         <p:spPr>
           <a:xfrm>
-            <a:off x="457200" y="3481200"/>
-            <a:ext cx="955440" cy="762120"/>
+            <a:off x="457200" y="3676320"/>
+            <a:ext cx="465840" cy="371520"/>
           </a:xfrm>
           <a:prstGeom prst="rect">
             <a:avLst/>
@@ -431,8 +431,8 @@
         </p:blipFill>
         <p:spPr>
           <a:xfrm>
-            <a:off x="457200" y="3481200"/>
-            <a:ext cx="955440" cy="762120"/>
+            <a:off x="457200" y="3676320"/>
+            <a:ext cx="465840" cy="371520"/>
           </a:xfrm>
           <a:prstGeom prst="rect">
             <a:avLst/>
@@ -499,7 +499,7 @@
         <p:spPr>
           <a:xfrm>
             <a:off x="457200" y="274680"/>
-            <a:ext cx="8228160" cy="1143000"/>
+            <a:ext cx="8227800" cy="1143000"/>
           </a:xfrm>
           <a:prstGeom prst="rect">
             <a:avLst/>
@@ -526,7 +526,7 @@
         <p:spPr>
           <a:xfrm>
             <a:off x="457200" y="1600200"/>
-            <a:ext cx="955440" cy="4524840"/>
+            <a:ext cx="465840" cy="4524480"/>
           </a:xfrm>
           <a:prstGeom prst="rect">
             <a:avLst/>
@@ -575,7 +575,7 @@
         <p:spPr>
           <a:xfrm>
             <a:off x="457200" y="274680"/>
-            <a:ext cx="8228160" cy="1143000"/>
+            <a:ext cx="8227800" cy="1143000"/>
           </a:xfrm>
           <a:prstGeom prst="rect">
             <a:avLst/>
@@ -602,7 +602,7 @@
         <p:spPr>
           <a:xfrm>
             <a:off x="457200" y="1600200"/>
-            <a:ext cx="955440" cy="4524480"/>
+            <a:ext cx="465840" cy="4524120"/>
           </a:xfrm>
           <a:prstGeom prst="rect">
             <a:avLst/>
@@ -650,7 +650,7 @@
         <p:spPr>
           <a:xfrm>
             <a:off x="457200" y="274680"/>
-            <a:ext cx="8228160" cy="1143000"/>
+            <a:ext cx="8227800" cy="1143000"/>
           </a:xfrm>
           <a:prstGeom prst="rect">
             <a:avLst/>
@@ -677,7 +677,7 @@
         <p:spPr>
           <a:xfrm>
             <a:off x="457200" y="1600200"/>
-            <a:ext cx="466200" cy="4524480"/>
+            <a:ext cx="227160" cy="4524120"/>
           </a:xfrm>
           <a:prstGeom prst="rect">
             <a:avLst/>
@@ -702,8 +702,8 @@
         </p:nvSpPr>
         <p:spPr>
           <a:xfrm>
-            <a:off x="947160" y="1600200"/>
-            <a:ext cx="466200" cy="4524480"/>
+            <a:off x="696240" y="1600200"/>
+            <a:ext cx="227160" cy="4524120"/>
           </a:xfrm>
           <a:prstGeom prst="rect">
             <a:avLst/>
@@ -751,7 +751,7 @@
         <p:spPr>
           <a:xfrm>
             <a:off x="457200" y="274680"/>
-            <a:ext cx="8228160" cy="1143000"/>
+            <a:ext cx="8227800" cy="1143000"/>
           </a:xfrm>
           <a:prstGeom prst="rect">
             <a:avLst/>
@@ -800,7 +800,7 @@
         <p:spPr>
           <a:xfrm>
             <a:off x="457200" y="274680"/>
-            <a:ext cx="8228160" cy="5298120"/>
+            <a:ext cx="8227800" cy="5298120"/>
           </a:xfrm>
           <a:prstGeom prst="rect">
             <a:avLst/>
@@ -849,7 +849,7 @@
         <p:spPr>
           <a:xfrm>
             <a:off x="457200" y="274680"/>
-            <a:ext cx="8228160" cy="1143000"/>
+            <a:ext cx="8227800" cy="1143000"/>
           </a:xfrm>
           <a:prstGeom prst="rect">
             <a:avLst/>
@@ -876,7 +876,7 @@
         <p:spPr>
           <a:xfrm>
             <a:off x="457200" y="1600200"/>
-            <a:ext cx="466200" cy="2157840"/>
+            <a:ext cx="227160" cy="2157840"/>
           </a:xfrm>
           <a:prstGeom prst="rect">
             <a:avLst/>
@@ -902,7 +902,7 @@
         <p:spPr>
           <a:xfrm>
             <a:off x="457200" y="3963600"/>
-            <a:ext cx="466200" cy="2157840"/>
+            <a:ext cx="227160" cy="2157840"/>
           </a:xfrm>
           <a:prstGeom prst="rect">
             <a:avLst/>
@@ -927,8 +927,8 @@
         </p:nvSpPr>
         <p:spPr>
           <a:xfrm>
-            <a:off x="947160" y="1600200"/>
-            <a:ext cx="466200" cy="4524480"/>
+            <a:off x="696240" y="1600200"/>
+            <a:ext cx="227160" cy="4524120"/>
           </a:xfrm>
           <a:prstGeom prst="rect">
             <a:avLst/>
@@ -976,7 +976,7 @@
         <p:spPr>
           <a:xfrm>
             <a:off x="457200" y="274680"/>
-            <a:ext cx="8228160" cy="1143000"/>
+            <a:ext cx="8227800" cy="1143000"/>
           </a:xfrm>
           <a:prstGeom prst="rect">
             <a:avLst/>
@@ -1003,7 +1003,7 @@
         <p:spPr>
           <a:xfrm>
             <a:off x="457200" y="1600200"/>
-            <a:ext cx="955440" cy="4524840"/>
+            <a:ext cx="465840" cy="4524480"/>
           </a:xfrm>
           <a:prstGeom prst="rect">
             <a:avLst/>
@@ -1052,7 +1052,7 @@
         <p:spPr>
           <a:xfrm>
             <a:off x="457200" y="274680"/>
-            <a:ext cx="8228160" cy="1143000"/>
+            <a:ext cx="8227800" cy="1143000"/>
           </a:xfrm>
           <a:prstGeom prst="rect">
             <a:avLst/>
@@ -1079,7 +1079,7 @@
         <p:spPr>
           <a:xfrm>
             <a:off x="457200" y="1600200"/>
-            <a:ext cx="466200" cy="4524480"/>
+            <a:ext cx="227160" cy="4524120"/>
           </a:xfrm>
           <a:prstGeom prst="rect">
             <a:avLst/>
@@ -1104,8 +1104,8 @@
         </p:nvSpPr>
         <p:spPr>
           <a:xfrm>
-            <a:off x="947160" y="1600200"/>
-            <a:ext cx="466200" cy="2157840"/>
+            <a:off x="696240" y="1600200"/>
+            <a:ext cx="227160" cy="2157840"/>
           </a:xfrm>
           <a:prstGeom prst="rect">
             <a:avLst/>
@@ -1130,8 +1130,8 @@
         </p:nvSpPr>
         <p:spPr>
           <a:xfrm>
-            <a:off x="947160" y="3963600"/>
-            <a:ext cx="466200" cy="2157840"/>
+            <a:off x="696240" y="3963600"/>
+            <a:ext cx="227160" cy="2157840"/>
           </a:xfrm>
           <a:prstGeom prst="rect">
             <a:avLst/>
@@ -1179,7 +1179,7 @@
         <p:spPr>
           <a:xfrm>
             <a:off x="457200" y="274680"/>
-            <a:ext cx="8228160" cy="1143000"/>
+            <a:ext cx="8227800" cy="1143000"/>
           </a:xfrm>
           <a:prstGeom prst="rect">
             <a:avLst/>
@@ -1206,7 +1206,7 @@
         <p:spPr>
           <a:xfrm>
             <a:off x="457200" y="1600200"/>
-            <a:ext cx="466200" cy="2157840"/>
+            <a:ext cx="227160" cy="2157840"/>
           </a:xfrm>
           <a:prstGeom prst="rect">
             <a:avLst/>
@@ -1231,8 +1231,8 @@
         </p:nvSpPr>
         <p:spPr>
           <a:xfrm>
-            <a:off x="947160" y="1600200"/>
-            <a:ext cx="466200" cy="2157840"/>
+            <a:off x="696240" y="1600200"/>
+            <a:ext cx="227160" cy="2157840"/>
           </a:xfrm>
           <a:prstGeom prst="rect">
             <a:avLst/>
@@ -1258,7 +1258,7 @@
         <p:spPr>
           <a:xfrm>
             <a:off x="457200" y="3963600"/>
-            <a:ext cx="955440" cy="2157840"/>
+            <a:ext cx="465840" cy="2157840"/>
           </a:xfrm>
           <a:prstGeom prst="rect">
             <a:avLst/>
@@ -1306,7 +1306,7 @@
         <p:spPr>
           <a:xfrm>
             <a:off x="457200" y="274680"/>
-            <a:ext cx="8228160" cy="1143000"/>
+            <a:ext cx="8227800" cy="1143000"/>
           </a:xfrm>
           <a:prstGeom prst="rect">
             <a:avLst/>
@@ -1333,7 +1333,7 @@
         <p:spPr>
           <a:xfrm>
             <a:off x="457200" y="1600200"/>
-            <a:ext cx="955440" cy="2157840"/>
+            <a:ext cx="465840" cy="2157840"/>
           </a:xfrm>
           <a:prstGeom prst="rect">
             <a:avLst/>
@@ -1359,7 +1359,7 @@
         <p:spPr>
           <a:xfrm>
             <a:off x="457200" y="3963600"/>
-            <a:ext cx="955440" cy="2157840"/>
+            <a:ext cx="465840" cy="2157840"/>
           </a:xfrm>
           <a:prstGeom prst="rect">
             <a:avLst/>
@@ -1407,7 +1407,7 @@
         <p:spPr>
           <a:xfrm>
             <a:off x="457200" y="274680"/>
-            <a:ext cx="8228160" cy="1143000"/>
+            <a:ext cx="8227800" cy="1143000"/>
           </a:xfrm>
           <a:prstGeom prst="rect">
             <a:avLst/>
@@ -1434,7 +1434,7 @@
         <p:spPr>
           <a:xfrm>
             <a:off x="457200" y="1600200"/>
-            <a:ext cx="466200" cy="2157840"/>
+            <a:ext cx="227160" cy="2157840"/>
           </a:xfrm>
           <a:prstGeom prst="rect">
             <a:avLst/>
@@ -1459,8 +1459,8 @@
         </p:nvSpPr>
         <p:spPr>
           <a:xfrm>
-            <a:off x="947160" y="1600200"/>
-            <a:ext cx="466200" cy="2157840"/>
+            <a:off x="696240" y="1600200"/>
+            <a:ext cx="227160" cy="2157840"/>
           </a:xfrm>
           <a:prstGeom prst="rect">
             <a:avLst/>
@@ -1485,8 +1485,8 @@
         </p:nvSpPr>
         <p:spPr>
           <a:xfrm>
-            <a:off x="947160" y="3963600"/>
-            <a:ext cx="466200" cy="2157840"/>
+            <a:off x="696240" y="3963600"/>
+            <a:ext cx="227160" cy="2157840"/>
           </a:xfrm>
           <a:prstGeom prst="rect">
             <a:avLst/>
@@ -1512,7 +1512,7 @@
         <p:spPr>
           <a:xfrm>
             <a:off x="457200" y="3963600"/>
-            <a:ext cx="466200" cy="2157840"/>
+            <a:ext cx="227160" cy="2157840"/>
           </a:xfrm>
           <a:prstGeom prst="rect">
             <a:avLst/>
@@ -1560,7 +1560,7 @@
         <p:spPr>
           <a:xfrm>
             <a:off x="457200" y="274680"/>
-            <a:ext cx="8228160" cy="1143000"/>
+            <a:ext cx="8227800" cy="1143000"/>
           </a:xfrm>
           <a:prstGeom prst="rect">
             <a:avLst/>
@@ -1587,7 +1587,7 @@
         <p:spPr>
           <a:xfrm>
             <a:off x="457200" y="1600200"/>
-            <a:ext cx="955440" cy="4524480"/>
+            <a:ext cx="465840" cy="4524120"/>
           </a:xfrm>
           <a:prstGeom prst="rect">
             <a:avLst/>
@@ -1613,7 +1613,7 @@
         <p:spPr>
           <a:xfrm>
             <a:off x="457200" y="1600200"/>
-            <a:ext cx="955440" cy="4524480"/>
+            <a:ext cx="465840" cy="4524120"/>
           </a:xfrm>
           <a:prstGeom prst="rect">
             <a:avLst/>
@@ -1640,8 +1640,8 @@
         </p:blipFill>
         <p:spPr>
           <a:xfrm>
-            <a:off x="457200" y="3481200"/>
-            <a:ext cx="955440" cy="762120"/>
+            <a:off x="457200" y="3676320"/>
+            <a:ext cx="465840" cy="371520"/>
           </a:xfrm>
           <a:prstGeom prst="rect">
             <a:avLst/>
@@ -1665,8 +1665,8 @@
         </p:blipFill>
         <p:spPr>
           <a:xfrm>
-            <a:off x="457200" y="3481200"/>
-            <a:ext cx="955440" cy="762120"/>
+            <a:off x="457200" y="3676320"/>
+            <a:ext cx="465840" cy="371520"/>
           </a:xfrm>
           <a:prstGeom prst="rect">
             <a:avLst/>
@@ -1711,7 +1711,7 @@
         <p:spPr>
           <a:xfrm>
             <a:off x="457200" y="274680"/>
-            <a:ext cx="8228160" cy="1143000"/>
+            <a:ext cx="8227800" cy="1143000"/>
           </a:xfrm>
           <a:prstGeom prst="rect">
             <a:avLst/>
@@ -1738,7 +1738,7 @@
         <p:spPr>
           <a:xfrm>
             <a:off x="457200" y="1600200"/>
-            <a:ext cx="955440" cy="4524480"/>
+            <a:ext cx="465840" cy="4524120"/>
           </a:xfrm>
           <a:prstGeom prst="rect">
             <a:avLst/>
@@ -1786,7 +1786,7 @@
         <p:spPr>
           <a:xfrm>
             <a:off x="457200" y="274680"/>
-            <a:ext cx="8228160" cy="1143000"/>
+            <a:ext cx="8227800" cy="1143000"/>
           </a:xfrm>
           <a:prstGeom prst="rect">
             <a:avLst/>
@@ -1813,7 +1813,7 @@
         <p:spPr>
           <a:xfrm>
             <a:off x="457200" y="1600200"/>
-            <a:ext cx="466200" cy="4524480"/>
+            <a:ext cx="227160" cy="4524120"/>
           </a:xfrm>
           <a:prstGeom prst="rect">
             <a:avLst/>
@@ -1838,8 +1838,8 @@
         </p:nvSpPr>
         <p:spPr>
           <a:xfrm>
-            <a:off x="947160" y="1600200"/>
-            <a:ext cx="466200" cy="4524480"/>
+            <a:off x="696240" y="1600200"/>
+            <a:ext cx="227160" cy="4524120"/>
           </a:xfrm>
           <a:prstGeom prst="rect">
             <a:avLst/>
@@ -1887,7 +1887,7 @@
         <p:spPr>
           <a:xfrm>
             <a:off x="457200" y="274680"/>
-            <a:ext cx="8228160" cy="1143000"/>
+            <a:ext cx="8227800" cy="1143000"/>
           </a:xfrm>
           <a:prstGeom prst="rect">
             <a:avLst/>
@@ -1936,7 +1936,7 @@
         <p:spPr>
           <a:xfrm>
             <a:off x="457200" y="274680"/>
-            <a:ext cx="8228160" cy="5298120"/>
+            <a:ext cx="8227800" cy="5298120"/>
           </a:xfrm>
           <a:prstGeom prst="rect">
             <a:avLst/>
@@ -1985,7 +1985,7 @@
         <p:spPr>
           <a:xfrm>
             <a:off x="457200" y="274680"/>
-            <a:ext cx="8228160" cy="1143000"/>
+            <a:ext cx="8227800" cy="1143000"/>
           </a:xfrm>
           <a:prstGeom prst="rect">
             <a:avLst/>
@@ -2012,7 +2012,7 @@
         <p:spPr>
           <a:xfrm>
             <a:off x="457200" y="1600200"/>
-            <a:ext cx="466200" cy="2157840"/>
+            <a:ext cx="227160" cy="2157840"/>
           </a:xfrm>
           <a:prstGeom prst="rect">
             <a:avLst/>
@@ -2038,7 +2038,7 @@
         <p:spPr>
           <a:xfrm>
             <a:off x="457200" y="3963600"/>
-            <a:ext cx="466200" cy="2157840"/>
+            <a:ext cx="227160" cy="2157840"/>
           </a:xfrm>
           <a:prstGeom prst="rect">
             <a:avLst/>
@@ -2063,8 +2063,8 @@
         </p:nvSpPr>
         <p:spPr>
           <a:xfrm>
-            <a:off x="947160" y="1600200"/>
-            <a:ext cx="466200" cy="4524480"/>
+            <a:off x="696240" y="1600200"/>
+            <a:ext cx="227160" cy="4524120"/>
           </a:xfrm>
           <a:prstGeom prst="rect">
             <a:avLst/>
@@ -2112,7 +2112,7 @@
         <p:spPr>
           <a:xfrm>
             <a:off x="457200" y="274680"/>
-            <a:ext cx="8228160" cy="1143000"/>
+            <a:ext cx="8227800" cy="1143000"/>
           </a:xfrm>
           <a:prstGeom prst="rect">
             <a:avLst/>
@@ -2139,7 +2139,7 @@
         <p:spPr>
           <a:xfrm>
             <a:off x="457200" y="1600200"/>
-            <a:ext cx="466200" cy="4524480"/>
+            <a:ext cx="227160" cy="4524120"/>
           </a:xfrm>
           <a:prstGeom prst="rect">
             <a:avLst/>
@@ -2164,8 +2164,8 @@
         </p:nvSpPr>
         <p:spPr>
           <a:xfrm>
-            <a:off x="947160" y="1600200"/>
-            <a:ext cx="466200" cy="2157840"/>
+            <a:off x="696240" y="1600200"/>
+            <a:ext cx="227160" cy="2157840"/>
           </a:xfrm>
           <a:prstGeom prst="rect">
             <a:avLst/>
@@ -2190,8 +2190,8 @@
         </p:nvSpPr>
         <p:spPr>
           <a:xfrm>
-            <a:off x="947160" y="3963600"/>
-            <a:ext cx="466200" cy="2157840"/>
+            <a:off x="696240" y="3963600"/>
+            <a:ext cx="227160" cy="2157840"/>
           </a:xfrm>
           <a:prstGeom prst="rect">
             <a:avLst/>
@@ -2239,7 +2239,7 @@
         <p:spPr>
           <a:xfrm>
             <a:off x="457200" y="274680"/>
-            <a:ext cx="8228160" cy="1143000"/>
+            <a:ext cx="8227800" cy="1143000"/>
           </a:xfrm>
           <a:prstGeom prst="rect">
             <a:avLst/>
@@ -2266,7 +2266,7 @@
         <p:spPr>
           <a:xfrm>
             <a:off x="457200" y="1600200"/>
-            <a:ext cx="466200" cy="2157840"/>
+            <a:ext cx="227160" cy="2157840"/>
           </a:xfrm>
           <a:prstGeom prst="rect">
             <a:avLst/>
@@ -2291,8 +2291,8 @@
         </p:nvSpPr>
         <p:spPr>
           <a:xfrm>
-            <a:off x="947160" y="1600200"/>
-            <a:ext cx="466200" cy="2157840"/>
+            <a:off x="696240" y="1600200"/>
+            <a:ext cx="227160" cy="2157840"/>
           </a:xfrm>
           <a:prstGeom prst="rect">
             <a:avLst/>
@@ -2318,7 +2318,7 @@
         <p:spPr>
           <a:xfrm>
             <a:off x="457200" y="3963600"/>
-            <a:ext cx="955440" cy="2157840"/>
+            <a:ext cx="465840" cy="2157840"/>
           </a:xfrm>
           <a:prstGeom prst="rect">
             <a:avLst/>
@@ -2375,7 +2375,7 @@
         <p:spPr>
           <a:xfrm>
             <a:off x="281880" y="6209280"/>
-            <a:ext cx="1453680" cy="510840"/>
+            <a:ext cx="1453320" cy="510480"/>
           </a:xfrm>
           <a:prstGeom prst="rect">
             <a:avLst/>
@@ -2394,7 +2394,7 @@
         <p:spPr>
           <a:xfrm>
             <a:off x="6544800" y="6344280"/>
-            <a:ext cx="2375640" cy="363600"/>
+            <a:ext cx="2375280" cy="363240"/>
           </a:xfrm>
           <a:prstGeom prst="rect">
             <a:avLst/>
@@ -2660,7 +2660,7 @@
         <p:spPr>
           <a:xfrm>
             <a:off x="281880" y="6209280"/>
-            <a:ext cx="1453680" cy="510840"/>
+            <a:ext cx="1453320" cy="510480"/>
           </a:xfrm>
           <a:prstGeom prst="rect">
             <a:avLst/>
@@ -2679,7 +2679,7 @@
         <p:spPr>
           <a:xfrm>
             <a:off x="6544800" y="6344280"/>
-            <a:ext cx="2375640" cy="363600"/>
+            <a:ext cx="2375280" cy="363240"/>
           </a:xfrm>
           <a:prstGeom prst="rect">
             <a:avLst/>
@@ -2745,7 +2745,7 @@
         <p:spPr>
           <a:xfrm>
             <a:off x="457200" y="274680"/>
-            <a:ext cx="8228160" cy="1142640"/>
+            <a:ext cx="8227800" cy="1142640"/>
           </a:xfrm>
           <a:prstGeom prst="rect">
             <a:avLst/>
@@ -2777,7 +2777,7 @@
         <p:spPr>
           <a:xfrm>
             <a:off x="457200" y="1600200"/>
-            <a:ext cx="955440" cy="4524480"/>
+            <a:ext cx="465840" cy="4524120"/>
           </a:xfrm>
           <a:prstGeom prst="rect">
             <a:avLst/>
@@ -2897,8 +2897,8 @@
         </p:nvSpPr>
         <p:spPr>
           <a:xfrm>
-            <a:off x="1461240" y="1600200"/>
-            <a:ext cx="955440" cy="4524480"/>
+            <a:off x="947160" y="1600200"/>
+            <a:ext cx="465840" cy="4524120"/>
           </a:xfrm>
           <a:prstGeom prst="rect">
             <a:avLst/>
@@ -3058,7 +3058,7 @@
         <p:spPr>
           <a:xfrm>
             <a:off x="1685520" y="714600"/>
-            <a:ext cx="1864800" cy="544680"/>
+            <a:ext cx="1864440" cy="544320"/>
           </a:xfrm>
           <a:prstGeom prst="rect">
             <a:avLst/>
@@ -3083,7 +3083,7 @@
         <p:spPr>
           <a:xfrm>
             <a:off x="2028240" y="1260720"/>
-            <a:ext cx="1179360" cy="1336320"/>
+            <a:ext cx="1179000" cy="1335960"/>
           </a:xfrm>
           <a:prstGeom prst="rect">
             <a:avLst/>
@@ -3108,7 +3108,7 @@
         <p:spPr>
           <a:xfrm>
             <a:off x="5344200" y="1610640"/>
-            <a:ext cx="1953720" cy="877320"/>
+            <a:ext cx="1953360" cy="876960"/>
           </a:xfrm>
           <a:prstGeom prst="rect">
             <a:avLst/>
@@ -3127,7 +3127,7 @@
         <p:spPr>
           <a:xfrm>
             <a:off x="3695760" y="1044720"/>
-            <a:ext cx="1376280" cy="1003680"/>
+            <a:ext cx="1375920" cy="1003320"/>
           </a:xfrm>
           <a:prstGeom prst="rect">
             <a:avLst/>
@@ -3182,7 +3182,7 @@
         <p:spPr>
           <a:xfrm>
             <a:off x="5132520" y="626760"/>
-            <a:ext cx="2344680" cy="908280"/>
+            <a:ext cx="2344320" cy="907920"/>
           </a:xfrm>
           <a:prstGeom prst="rect">
             <a:avLst/>
@@ -3201,7 +3201,7 @@
         <p:spPr>
           <a:xfrm>
             <a:off x="60120" y="3090600"/>
-            <a:ext cx="8766360" cy="1429920"/>
+            <a:ext cx="8766000" cy="1429560"/>
           </a:xfrm>
           <a:prstGeom prst="rect">
             <a:avLst/>
@@ -3307,7 +3307,7 @@
         <p:spPr>
           <a:xfrm>
             <a:off x="457200" y="274680"/>
-            <a:ext cx="8228160" cy="1141560"/>
+            <a:ext cx="8227800" cy="1141200"/>
           </a:xfrm>
           <a:prstGeom prst="rect">
             <a:avLst/>
@@ -3347,7 +3347,7 @@
         <p:spPr>
           <a:xfrm>
             <a:off x="532080" y="1417320"/>
-            <a:ext cx="3506040" cy="4433760"/>
+            <a:ext cx="3505680" cy="4433400"/>
           </a:xfrm>
           <a:prstGeom prst="rect">
             <a:avLst/>
@@ -3496,7 +3496,7 @@
         <p:spPr>
           <a:xfrm>
             <a:off x="4023360" y="1291320"/>
-            <a:ext cx="5052240" cy="3920760"/>
+            <a:ext cx="5051880" cy="3920400"/>
           </a:xfrm>
           <a:prstGeom prst="rect">
             <a:avLst/>
@@ -3564,7 +3564,7 @@
         <p:spPr>
           <a:xfrm>
             <a:off x="457200" y="274680"/>
-            <a:ext cx="8228160" cy="1141560"/>
+            <a:ext cx="8227800" cy="1141200"/>
           </a:xfrm>
           <a:prstGeom prst="rect">
             <a:avLst/>
@@ -3604,7 +3604,7 @@
         <p:spPr>
           <a:xfrm>
             <a:off x="532080" y="1417320"/>
-            <a:ext cx="3506040" cy="4433760"/>
+            <a:ext cx="3505680" cy="4433400"/>
           </a:xfrm>
           <a:prstGeom prst="rect">
             <a:avLst/>
@@ -3707,7 +3707,7 @@
         <p:spPr>
           <a:xfrm>
             <a:off x="6553440" y="6356520"/>
-            <a:ext cx="2132640" cy="363960"/>
+            <a:ext cx="2132280" cy="363600"/>
           </a:xfrm>
           <a:prstGeom prst="rect">
             <a:avLst/>
@@ -3725,7 +3725,7 @@
                 <a:spcPct val="100000"/>
               </a:lnSpc>
             </a:pPr>
-            <a:fld id="{BC8C92B1-C411-4BFE-A7A2-F6CBEFE10ED8}" type="slidenum">
+            <a:fld id="{70C198B1-ACCA-40D4-9D02-4DE0752EE55E}" type="slidenum">
               <a:rPr lang="en-US">
                 <a:solidFill>
                   <a:srgbClr val="000000"/>
@@ -3747,7 +3747,7 @@
         <p:spPr>
           <a:xfrm>
             <a:off x="3124440" y="6356520"/>
-            <a:ext cx="2894400" cy="363960"/>
+            <a:ext cx="2894040" cy="363600"/>
           </a:xfrm>
           <a:prstGeom prst="rect">
             <a:avLst/>
@@ -3792,8 +3792,33 @@
         </p:blipFill>
         <p:spPr>
           <a:xfrm>
-            <a:off x="4754880" y="1280160"/>
-            <a:ext cx="4332960" cy="4743720"/>
+            <a:off x="4193280" y="1178640"/>
+            <a:ext cx="4676400" cy="3210480"/>
+          </a:xfrm>
+          <a:prstGeom prst="rect">
+            <a:avLst/>
+          </a:prstGeom>
+          <a:ln>
+            <a:noFill/>
+          </a:ln>
+        </p:spPr>
+      </p:pic>
+      <p:pic>
+        <p:nvPicPr>
+          <p:cNvPr id="93" name="" descr=""/>
+          <p:cNvPicPr/>
+          <p:nvPr/>
+        </p:nvPicPr>
+        <p:blipFill>
+          <a:blip r:embed="rId2"/>
+          <a:stretch>
+            <a:fillRect/>
+          </a:stretch>
+        </p:blipFill>
+        <p:spPr>
+          <a:xfrm>
+            <a:off x="4206240" y="4646880"/>
+            <a:ext cx="2232360" cy="1188360"/>
           </a:xfrm>
           <a:prstGeom prst="rect">
             <a:avLst/>
@@ -3854,14 +3879,14 @@
       </p:grpSpPr>
       <p:sp>
         <p:nvSpPr>
-          <p:cNvPr id="93" name="CustomShape 1"/>
+          <p:cNvPr id="94" name="CustomShape 1"/>
           <p:cNvSpPr/>
           <p:nvPr/>
         </p:nvSpPr>
         <p:spPr>
           <a:xfrm>
             <a:off x="457200" y="274680"/>
-            <a:ext cx="8228160" cy="1141560"/>
+            <a:ext cx="8227800" cy="1141200"/>
           </a:xfrm>
           <a:prstGeom prst="rect">
             <a:avLst/>
@@ -3894,14 +3919,14 @@
       </p:sp>
       <p:sp>
         <p:nvSpPr>
-          <p:cNvPr id="94" name="CustomShape 2"/>
+          <p:cNvPr id="95" name="CustomShape 2"/>
           <p:cNvSpPr/>
           <p:nvPr/>
         </p:nvSpPr>
         <p:spPr>
           <a:xfrm>
             <a:off x="532080" y="1417320"/>
-            <a:ext cx="3506040" cy="4433760"/>
+            <a:ext cx="3505680" cy="4433400"/>
           </a:xfrm>
           <a:prstGeom prst="rect">
             <a:avLst/>
@@ -3997,14 +4022,14 @@
       </p:sp>
       <p:sp>
         <p:nvSpPr>
-          <p:cNvPr id="95" name="CustomShape 3"/>
+          <p:cNvPr id="96" name="CustomShape 3"/>
           <p:cNvSpPr/>
           <p:nvPr/>
         </p:nvSpPr>
         <p:spPr>
           <a:xfrm>
             <a:off x="6553440" y="6356520"/>
-            <a:ext cx="2132640" cy="363960"/>
+            <a:ext cx="2132280" cy="363600"/>
           </a:xfrm>
           <a:prstGeom prst="rect">
             <a:avLst/>
@@ -4022,7 +4047,7 @@
                 <a:spcPct val="100000"/>
               </a:lnSpc>
             </a:pPr>
-            <a:fld id="{48DF4E2A-664D-4AEE-8932-73BE6D1EA249}" type="slidenum">
+            <a:fld id="{B992C2AB-B92D-45FD-9B0B-83ABD2913D25}" type="slidenum">
               <a:rPr lang="en-US">
                 <a:solidFill>
                   <a:srgbClr val="000000"/>
@@ -4037,14 +4062,14 @@
       </p:sp>
       <p:sp>
         <p:nvSpPr>
-          <p:cNvPr id="96" name="CustomShape 4"/>
+          <p:cNvPr id="97" name="CustomShape 4"/>
           <p:cNvSpPr/>
           <p:nvPr/>
         </p:nvSpPr>
         <p:spPr>
           <a:xfrm>
             <a:off x="3124440" y="6356520"/>
-            <a:ext cx="2894400" cy="363960"/>
+            <a:ext cx="2894040" cy="363600"/>
           </a:xfrm>
           <a:prstGeom prst="rect">
             <a:avLst/>
@@ -4077,7 +4102,7 @@
       </p:sp>
       <p:pic>
         <p:nvPicPr>
-          <p:cNvPr id="97" name="Afbeelding 12" descr=""/>
+          <p:cNvPr id="98" name="" descr=""/>
           <p:cNvPicPr/>
           <p:nvPr/>
         </p:nvPicPr>
@@ -4089,8 +4114,8 @@
         </p:blipFill>
         <p:spPr>
           <a:xfrm>
-            <a:off x="4502160" y="1598760"/>
-            <a:ext cx="3034080" cy="1472040"/>
+            <a:off x="4572000" y="1103040"/>
+            <a:ext cx="1920240" cy="1405080"/>
           </a:xfrm>
           <a:prstGeom prst="rect">
             <a:avLst/>
@@ -4102,7 +4127,7 @@
       </p:pic>
       <p:pic>
         <p:nvPicPr>
-          <p:cNvPr id="98" name="Afbeelding 13" descr=""/>
+          <p:cNvPr id="99" name="" descr=""/>
           <p:cNvPicPr/>
           <p:nvPr/>
         </p:nvPicPr>
@@ -4114,8 +4139,8 @@
         </p:blipFill>
         <p:spPr>
           <a:xfrm>
-            <a:off x="4476960" y="3212640"/>
-            <a:ext cx="4151880" cy="1383120"/>
+            <a:off x="4564800" y="2680560"/>
+            <a:ext cx="3116160" cy="1517040"/>
           </a:xfrm>
           <a:prstGeom prst="rect">
             <a:avLst/>
@@ -4127,7 +4152,7 @@
       </p:pic>
       <p:pic>
         <p:nvPicPr>
-          <p:cNvPr id="99" name="Afbeelding 14" descr=""/>
+          <p:cNvPr id="100" name="" descr=""/>
           <p:cNvPicPr/>
           <p:nvPr/>
         </p:nvPicPr>
@@ -4139,8 +4164,8 @@
         </p:blipFill>
         <p:spPr>
           <a:xfrm>
-            <a:off x="4458960" y="4955400"/>
-            <a:ext cx="4405680" cy="494280"/>
+            <a:off x="4579920" y="4389120"/>
+            <a:ext cx="3611880" cy="731520"/>
           </a:xfrm>
           <a:prstGeom prst="rect">
             <a:avLst/>
@@ -4201,14 +4226,14 @@
       </p:grpSpPr>
       <p:sp>
         <p:nvSpPr>
-          <p:cNvPr id="100" name="CustomShape 1"/>
+          <p:cNvPr id="101" name="CustomShape 1"/>
           <p:cNvSpPr/>
           <p:nvPr/>
         </p:nvSpPr>
         <p:spPr>
           <a:xfrm>
             <a:off x="457200" y="274680"/>
-            <a:ext cx="8228160" cy="1141560"/>
+            <a:ext cx="8227800" cy="1141200"/>
           </a:xfrm>
           <a:prstGeom prst="rect">
             <a:avLst/>
@@ -4241,14 +4266,14 @@
       </p:sp>
       <p:sp>
         <p:nvSpPr>
-          <p:cNvPr id="101" name="CustomShape 2"/>
+          <p:cNvPr id="102" name="CustomShape 2"/>
           <p:cNvSpPr/>
           <p:nvPr/>
         </p:nvSpPr>
         <p:spPr>
           <a:xfrm>
             <a:off x="532080" y="1417320"/>
-            <a:ext cx="3506040" cy="4433760"/>
+            <a:ext cx="3505680" cy="4433400"/>
           </a:xfrm>
           <a:prstGeom prst="rect">
             <a:avLst/>
@@ -4362,22 +4387,22 @@
               <a:rPr lang="en-US">
                 <a:latin typeface="Comic Sans MS"/>
               </a:rPr>
-              <a:t>When the red dot hits the balloon, the balloon should disappear and make a 'pop' sound.</a:t>
-            </a:r>
-            <a:endParaRPr/>
-          </a:p>
-        </p:txBody>
-      </p:sp>
-      <p:sp>
-        <p:nvSpPr>
-          <p:cNvPr id="102" name="CustomShape 3"/>
+              <a:t>When the red dot hits the balloon, the balloon should hide and make a 'pop' sound.</a:t>
+            </a:r>
+            <a:endParaRPr/>
+          </a:p>
+        </p:txBody>
+      </p:sp>
+      <p:sp>
+        <p:nvSpPr>
+          <p:cNvPr id="103" name="CustomShape 3"/>
           <p:cNvSpPr/>
           <p:nvPr/>
         </p:nvSpPr>
         <p:spPr>
           <a:xfrm>
             <a:off x="6553440" y="6356520"/>
-            <a:ext cx="2132640" cy="363960"/>
+            <a:ext cx="2132280" cy="363600"/>
           </a:xfrm>
           <a:prstGeom prst="rect">
             <a:avLst/>
@@ -4395,7 +4420,7 @@
                 <a:spcPct val="100000"/>
               </a:lnSpc>
             </a:pPr>
-            <a:fld id="{E74A8E2E-2869-4163-B77D-F389FF0A1BA1}" type="slidenum">
+            <a:fld id="{307EA8FA-32C2-46D2-9155-C801922B1BF7}" type="slidenum">
               <a:rPr lang="en-US">
                 <a:solidFill>
                   <a:srgbClr val="000000"/>
@@ -4410,14 +4435,14 @@
       </p:sp>
       <p:sp>
         <p:nvSpPr>
-          <p:cNvPr id="103" name="CustomShape 4"/>
+          <p:cNvPr id="104" name="CustomShape 4"/>
           <p:cNvSpPr/>
           <p:nvPr/>
         </p:nvSpPr>
         <p:spPr>
           <a:xfrm>
             <a:off x="3124440" y="6356520"/>
-            <a:ext cx="2894400" cy="363960"/>
+            <a:ext cx="2894040" cy="363600"/>
           </a:xfrm>
           <a:prstGeom prst="rect">
             <a:avLst/>
@@ -4450,7 +4475,7 @@
       </p:sp>
       <p:pic>
         <p:nvPicPr>
-          <p:cNvPr id="104" name="Afbeelding 7" descr=""/>
+          <p:cNvPr id="105" name="" descr=""/>
           <p:cNvPicPr/>
           <p:nvPr/>
         </p:nvPicPr>
@@ -4462,8 +4487,8 @@
         </p:blipFill>
         <p:spPr>
           <a:xfrm>
-            <a:off x="4140000" y="1391040"/>
-            <a:ext cx="4854240" cy="2951280"/>
+            <a:off x="4114800" y="936720"/>
+            <a:ext cx="3200400" cy="3027960"/>
           </a:xfrm>
           <a:prstGeom prst="rect">
             <a:avLst/>
@@ -4475,7 +4500,7 @@
       </p:pic>
       <p:pic>
         <p:nvPicPr>
-          <p:cNvPr id="105" name="Afbeelding 8" descr=""/>
+          <p:cNvPr id="106" name="" descr=""/>
           <p:cNvPicPr/>
           <p:nvPr/>
         </p:nvPicPr>
@@ -4487,8 +4512,8 @@
         </p:blipFill>
         <p:spPr>
           <a:xfrm>
-            <a:off x="4140360" y="4434120"/>
-            <a:ext cx="2770920" cy="1784520"/>
+            <a:off x="4095360" y="4081680"/>
+            <a:ext cx="2579760" cy="1895040"/>
           </a:xfrm>
           <a:prstGeom prst="rect">
             <a:avLst/>
@@ -4549,14 +4574,14 @@
       </p:grpSpPr>
       <p:sp>
         <p:nvSpPr>
-          <p:cNvPr id="106" name="CustomShape 1"/>
+          <p:cNvPr id="107" name="CustomShape 1"/>
           <p:cNvSpPr/>
           <p:nvPr/>
         </p:nvSpPr>
         <p:spPr>
           <a:xfrm>
             <a:off x="457200" y="274680"/>
-            <a:ext cx="8228160" cy="1141560"/>
+            <a:ext cx="8227800" cy="1141200"/>
           </a:xfrm>
           <a:prstGeom prst="rect">
             <a:avLst/>
@@ -4589,14 +4614,14 @@
       </p:sp>
       <p:sp>
         <p:nvSpPr>
-          <p:cNvPr id="107" name="CustomShape 2"/>
+          <p:cNvPr id="108" name="CustomShape 2"/>
           <p:cNvSpPr/>
           <p:nvPr/>
         </p:nvSpPr>
         <p:spPr>
           <a:xfrm>
             <a:off x="532080" y="1417320"/>
-            <a:ext cx="3506040" cy="4433760"/>
+            <a:ext cx="3505680" cy="4433400"/>
           </a:xfrm>
           <a:prstGeom prst="rect">
             <a:avLst/>
@@ -4704,14 +4729,14 @@
       </p:sp>
       <p:sp>
         <p:nvSpPr>
-          <p:cNvPr id="108" name="CustomShape 3"/>
+          <p:cNvPr id="109" name="CustomShape 3"/>
           <p:cNvSpPr/>
           <p:nvPr/>
         </p:nvSpPr>
         <p:spPr>
           <a:xfrm>
             <a:off x="6553440" y="6356520"/>
-            <a:ext cx="2132640" cy="363960"/>
+            <a:ext cx="2132280" cy="363600"/>
           </a:xfrm>
           <a:prstGeom prst="rect">
             <a:avLst/>
@@ -4729,7 +4754,7 @@
                 <a:spcPct val="100000"/>
               </a:lnSpc>
             </a:pPr>
-            <a:fld id="{2987109C-3E5D-4861-BEF6-72FF38E2E553}" type="slidenum">
+            <a:fld id="{C35C3908-5709-4622-8481-767E091689EE}" type="slidenum">
               <a:rPr lang="en-US">
                 <a:solidFill>
                   <a:srgbClr val="000000"/>
@@ -4744,14 +4769,14 @@
       </p:sp>
       <p:sp>
         <p:nvSpPr>
-          <p:cNvPr id="109" name="CustomShape 4"/>
+          <p:cNvPr id="110" name="CustomShape 4"/>
           <p:cNvSpPr/>
           <p:nvPr/>
         </p:nvSpPr>
         <p:spPr>
           <a:xfrm>
             <a:off x="3124440" y="6356520"/>
-            <a:ext cx="2894400" cy="363960"/>
+            <a:ext cx="2894040" cy="363600"/>
           </a:xfrm>
           <a:prstGeom prst="rect">
             <a:avLst/>
@@ -4784,7 +4809,7 @@
       </p:sp>
       <p:pic>
         <p:nvPicPr>
-          <p:cNvPr id="110" name="Afbeelding 2" descr=""/>
+          <p:cNvPr id="111" name="" descr=""/>
           <p:cNvPicPr/>
           <p:nvPr/>
         </p:nvPicPr>
@@ -4796,8 +4821,8 @@
         </p:blipFill>
         <p:spPr>
           <a:xfrm>
-            <a:off x="4408560" y="1391400"/>
-            <a:ext cx="3179160" cy="2621880"/>
+            <a:off x="4389120" y="1155600"/>
+            <a:ext cx="2511720" cy="3050640"/>
           </a:xfrm>
           <a:prstGeom prst="rect">
             <a:avLst/>
@@ -4809,7 +4834,7 @@
       </p:pic>
       <p:pic>
         <p:nvPicPr>
-          <p:cNvPr id="111" name="Afbeelding 5" descr=""/>
+          <p:cNvPr id="112" name="" descr=""/>
           <p:cNvPicPr/>
           <p:nvPr/>
         </p:nvPicPr>
@@ -4821,8 +4846,8 @@
         </p:blipFill>
         <p:spPr>
           <a:xfrm>
-            <a:off x="4408200" y="4198680"/>
-            <a:ext cx="4456800" cy="1357920"/>
+            <a:off x="4404600" y="4389120"/>
+            <a:ext cx="3997440" cy="1005840"/>
           </a:xfrm>
           <a:prstGeom prst="rect">
             <a:avLst/>
@@ -4883,14 +4908,14 @@
       </p:grpSpPr>
       <p:sp>
         <p:nvSpPr>
-          <p:cNvPr id="112" name="CustomShape 1"/>
+          <p:cNvPr id="113" name="CustomShape 1"/>
           <p:cNvSpPr/>
           <p:nvPr/>
         </p:nvSpPr>
         <p:spPr>
           <a:xfrm>
             <a:off x="457200" y="274680"/>
-            <a:ext cx="8228160" cy="1141560"/>
+            <a:ext cx="8227800" cy="1141200"/>
           </a:xfrm>
           <a:prstGeom prst="rect">
             <a:avLst/>
@@ -4923,14 +4948,14 @@
       </p:sp>
       <p:sp>
         <p:nvSpPr>
-          <p:cNvPr id="113" name="CustomShape 2"/>
+          <p:cNvPr id="114" name="CustomShape 2"/>
           <p:cNvSpPr/>
           <p:nvPr/>
         </p:nvSpPr>
         <p:spPr>
           <a:xfrm>
             <a:off x="532080" y="1417320"/>
-            <a:ext cx="3506040" cy="4433760"/>
+            <a:ext cx="3505680" cy="4433400"/>
           </a:xfrm>
           <a:prstGeom prst="rect">
             <a:avLst/>
@@ -4943,14 +4968,14 @@
       </p:sp>
       <p:sp>
         <p:nvSpPr>
-          <p:cNvPr id="114" name="CustomShape 3"/>
+          <p:cNvPr id="115" name="CustomShape 3"/>
           <p:cNvSpPr/>
           <p:nvPr/>
         </p:nvSpPr>
         <p:spPr>
           <a:xfrm>
             <a:off x="6553440" y="6356520"/>
-            <a:ext cx="2132640" cy="363960"/>
+            <a:ext cx="2132280" cy="363600"/>
           </a:xfrm>
           <a:prstGeom prst="rect">
             <a:avLst/>
@@ -4968,7 +4993,7 @@
                 <a:spcPct val="100000"/>
               </a:lnSpc>
             </a:pPr>
-            <a:fld id="{840A5F78-977A-4E67-A21B-D340693C58FD}" type="slidenum">
+            <a:fld id="{975CE56C-AA33-4FE0-8824-93B91DFDAEC4}" type="slidenum">
               <a:rPr lang="en-US">
                 <a:solidFill>
                   <a:srgbClr val="000000"/>
@@ -4983,14 +5008,14 @@
       </p:sp>
       <p:sp>
         <p:nvSpPr>
-          <p:cNvPr id="115" name="CustomShape 4"/>
+          <p:cNvPr id="116" name="CustomShape 4"/>
           <p:cNvSpPr/>
           <p:nvPr/>
         </p:nvSpPr>
         <p:spPr>
           <a:xfrm>
             <a:off x="3124440" y="6356520"/>
-            <a:ext cx="2894400" cy="363960"/>
+            <a:ext cx="2894040" cy="363600"/>
           </a:xfrm>
           <a:prstGeom prst="rect">
             <a:avLst/>
@@ -5023,7 +5048,7 @@
       </p:sp>
       <p:pic>
         <p:nvPicPr>
-          <p:cNvPr id="116" name="Afbeelding 7" descr=""/>
+          <p:cNvPr id="117" name="Afbeelding 11" descr=""/>
           <p:cNvPicPr/>
           <p:nvPr/>
         </p:nvPicPr>
@@ -5035,8 +5060,8 @@
         </p:blipFill>
         <p:spPr>
           <a:xfrm>
-            <a:off x="4385880" y="1277280"/>
-            <a:ext cx="4332960" cy="3369960"/>
+            <a:off x="662040" y="3616560"/>
+            <a:ext cx="507240" cy="638640"/>
           </a:xfrm>
           <a:prstGeom prst="rect">
             <a:avLst/>
@@ -5048,7 +5073,7 @@
       </p:pic>
       <p:pic>
         <p:nvPicPr>
-          <p:cNvPr id="117" name="Afbeelding 17" descr=""/>
+          <p:cNvPr id="118" name="Afbeelding 13" descr=""/>
           <p:cNvPicPr/>
           <p:nvPr/>
         </p:nvPicPr>
@@ -5060,8 +5085,8 @@
         </p:blipFill>
         <p:spPr>
           <a:xfrm>
-            <a:off x="544680" y="4586040"/>
-            <a:ext cx="2437200" cy="1497600"/>
+            <a:off x="1652760" y="3555720"/>
+            <a:ext cx="604080" cy="713520"/>
           </a:xfrm>
           <a:prstGeom prst="rect">
             <a:avLst/>
@@ -5073,7 +5098,7 @@
       </p:pic>
       <p:pic>
         <p:nvPicPr>
-          <p:cNvPr id="118" name="Afbeelding 11" descr=""/>
+          <p:cNvPr id="119" name="Afbeelding 12" descr=""/>
           <p:cNvPicPr/>
           <p:nvPr/>
         </p:nvPicPr>
@@ -5085,8 +5110,8 @@
         </p:blipFill>
         <p:spPr>
           <a:xfrm>
-            <a:off x="662040" y="3616560"/>
-            <a:ext cx="507600" cy="639000"/>
+            <a:off x="2258280" y="3580200"/>
+            <a:ext cx="563040" cy="695160"/>
           </a:xfrm>
           <a:prstGeom prst="rect">
             <a:avLst/>
@@ -5096,9 +5121,253 @@
           </a:ln>
         </p:spPr>
       </p:pic>
+      <p:sp>
+        <p:nvSpPr>
+          <p:cNvPr id="120" name="CustomShape 5"/>
+          <p:cNvSpPr/>
+          <p:nvPr/>
+        </p:nvSpPr>
+        <p:spPr>
+          <a:xfrm>
+            <a:off x="444600" y="4272840"/>
+            <a:ext cx="963360" cy="363600"/>
+          </a:xfrm>
+          <a:prstGeom prst="rect">
+            <a:avLst/>
+          </a:prstGeom>
+          <a:noFill/>
+          <a:ln>
+            <a:noFill/>
+          </a:ln>
+        </p:spPr>
+        <p:txBody>
+          <a:bodyPr wrap="none" lIns="90000" rIns="90000" tIns="45000" bIns="45000"/>
+          <a:p>
+            <a:pPr>
+              <a:lnSpc>
+                <a:spcPct val="100000"/>
+              </a:lnSpc>
+            </a:pPr>
+            <a:r>
+              <a:rPr lang="en-US">
+                <a:solidFill>
+                  <a:srgbClr val="000000"/>
+                </a:solidFill>
+                <a:latin typeface="Calibri"/>
+              </a:rPr>
+              <a:t>1 Point</a:t>
+            </a:r>
+            <a:endParaRPr/>
+          </a:p>
+        </p:txBody>
+      </p:sp>
+      <p:sp>
+        <p:nvSpPr>
+          <p:cNvPr id="121" name="CustomShape 6"/>
+          <p:cNvSpPr/>
+          <p:nvPr/>
+        </p:nvSpPr>
+        <p:spPr>
+          <a:xfrm>
+            <a:off x="1629000" y="4266360"/>
+            <a:ext cx="1275840" cy="363600"/>
+          </a:xfrm>
+          <a:prstGeom prst="rect">
+            <a:avLst/>
+          </a:prstGeom>
+          <a:noFill/>
+          <a:ln>
+            <a:noFill/>
+          </a:ln>
+        </p:spPr>
+        <p:txBody>
+          <a:bodyPr wrap="none" lIns="90000" rIns="90000" tIns="45000" bIns="45000"/>
+          <a:p>
+            <a:pPr>
+              <a:lnSpc>
+                <a:spcPct val="100000"/>
+              </a:lnSpc>
+            </a:pPr>
+            <a:r>
+              <a:rPr lang="en-US">
+                <a:solidFill>
+                  <a:srgbClr val="000000"/>
+                </a:solidFill>
+                <a:latin typeface="Calibri"/>
+              </a:rPr>
+              <a:t>-2 Points</a:t>
+            </a:r>
+            <a:endParaRPr/>
+          </a:p>
+        </p:txBody>
+      </p:sp>
+      <p:sp>
+        <p:nvSpPr>
+          <p:cNvPr id="122" name="CustomShape 7"/>
+          <p:cNvSpPr/>
+          <p:nvPr/>
+        </p:nvSpPr>
+        <p:spPr>
+          <a:xfrm>
+            <a:off x="333000" y="1425240"/>
+            <a:ext cx="3762000" cy="2283840"/>
+          </a:xfrm>
+          <a:prstGeom prst="rect">
+            <a:avLst/>
+          </a:prstGeom>
+          <a:noFill/>
+          <a:ln>
+            <a:noFill/>
+          </a:ln>
+        </p:spPr>
+        <p:txBody>
+          <a:bodyPr lIns="90000" rIns="90000" tIns="45000" bIns="45000"/>
+          <a:p>
+            <a:pPr>
+              <a:lnSpc>
+                <a:spcPct val="100000"/>
+              </a:lnSpc>
+            </a:pPr>
+            <a:r>
+              <a:rPr lang="en-US">
+                <a:solidFill>
+                  <a:srgbClr val="000000"/>
+                </a:solidFill>
+                <a:latin typeface="Comic Sans MS"/>
+              </a:rPr>
+              <a:t>Counting points!</a:t>
+            </a:r>
+            <a:endParaRPr/>
+          </a:p>
+          <a:p>
+            <a:pPr>
+              <a:lnSpc>
+                <a:spcPct val="100000"/>
+              </a:lnSpc>
+            </a:pPr>
+            <a:endParaRPr/>
+          </a:p>
+          <a:p>
+            <a:pPr>
+              <a:lnSpc>
+                <a:spcPct val="100000"/>
+              </a:lnSpc>
+            </a:pPr>
+            <a:r>
+              <a:rPr lang="en-US">
+                <a:solidFill>
+                  <a:srgbClr val="000000"/>
+                </a:solidFill>
+                <a:latin typeface="Comic Sans MS"/>
+              </a:rPr>
+              <a:t>Make a variable Data element with the name 'score'. </a:t>
+            </a:r>
+            <a:endParaRPr/>
+          </a:p>
+          <a:p>
+            <a:pPr>
+              <a:lnSpc>
+                <a:spcPct val="100000"/>
+              </a:lnSpc>
+            </a:pPr>
+            <a:endParaRPr/>
+          </a:p>
+          <a:p>
+            <a:pPr>
+              <a:lnSpc>
+                <a:spcPct val="100000"/>
+              </a:lnSpc>
+            </a:pPr>
+            <a:r>
+              <a:rPr lang="en-US">
+                <a:solidFill>
+                  <a:srgbClr val="000000"/>
+                </a:solidFill>
+                <a:latin typeface="Comic Sans MS"/>
+              </a:rPr>
+              <a:t>The score will be visible on the screen, with the following code the score will start at 0</a:t>
+            </a:r>
+            <a:endParaRPr/>
+          </a:p>
+        </p:txBody>
+      </p:sp>
+      <p:sp>
+        <p:nvSpPr>
+          <p:cNvPr id="123" name="CustomShape 8"/>
+          <p:cNvSpPr/>
+          <p:nvPr/>
+        </p:nvSpPr>
+        <p:spPr>
+          <a:xfrm>
+            <a:off x="3926880" y="5008680"/>
+            <a:ext cx="4669920" cy="912240"/>
+          </a:xfrm>
+          <a:prstGeom prst="rect">
+            <a:avLst/>
+          </a:prstGeom>
+          <a:noFill/>
+          <a:ln>
+            <a:noFill/>
+          </a:ln>
+        </p:spPr>
+        <p:txBody>
+          <a:bodyPr wrap="none" lIns="90000" rIns="90000" tIns="45000" bIns="45000"/>
+          <a:p>
+            <a:pPr>
+              <a:lnSpc>
+                <a:spcPct val="100000"/>
+              </a:lnSpc>
+            </a:pPr>
+            <a:r>
+              <a:rPr lang="en-US">
+                <a:solidFill>
+                  <a:srgbClr val="000000"/>
+                </a:solidFill>
+                <a:latin typeface="Calibri"/>
+              </a:rPr>
+              <a:t>The Balloon pop game is almost ready!</a:t>
+            </a:r>
+            <a:endParaRPr/>
+          </a:p>
+          <a:p>
+            <a:pPr>
+              <a:lnSpc>
+                <a:spcPct val="100000"/>
+              </a:lnSpc>
+            </a:pPr>
+            <a:r>
+              <a:rPr lang="en-US">
+                <a:solidFill>
+                  <a:srgbClr val="000000"/>
+                </a:solidFill>
+                <a:latin typeface="Calibri"/>
+              </a:rPr>
+              <a:t>Lets implement counting the points when the </a:t>
+            </a:r>
+            <a:endParaRPr/>
+          </a:p>
+          <a:p>
+            <a:pPr>
+              <a:lnSpc>
+                <a:spcPct val="100000"/>
+              </a:lnSpc>
+            </a:pPr>
+            <a:r>
+              <a:rPr lang="en-US">
+                <a:solidFill>
+                  <a:srgbClr val="000000"/>
+                </a:solidFill>
+                <a:latin typeface="Calibri"/>
+              </a:rPr>
+              <a:t>balloon is hit</a:t>
+            </a:r>
+            <a:endParaRPr/>
+          </a:p>
+        </p:txBody>
+      </p:sp>
       <p:pic>
         <p:nvPicPr>
-          <p:cNvPr id="119" name="Afbeelding 13" descr=""/>
+          <p:cNvPr id="124" name="" descr=""/>
           <p:cNvPicPr/>
           <p:nvPr/>
         </p:nvPicPr>
@@ -5110,8 +5379,8 @@
         </p:blipFill>
         <p:spPr>
           <a:xfrm>
-            <a:off x="1652760" y="3555720"/>
-            <a:ext cx="604440" cy="713880"/>
+            <a:off x="4176000" y="1097280"/>
+            <a:ext cx="3230640" cy="3363480"/>
           </a:xfrm>
           <a:prstGeom prst="rect">
             <a:avLst/>
@@ -5123,7 +5392,7 @@
       </p:pic>
       <p:pic>
         <p:nvPicPr>
-          <p:cNvPr id="120" name="Afbeelding 12" descr=""/>
+          <p:cNvPr id="125" name="" descr=""/>
           <p:cNvPicPr/>
           <p:nvPr/>
         </p:nvPicPr>
@@ -5135,8 +5404,8 @@
         </p:blipFill>
         <p:spPr>
           <a:xfrm>
-            <a:off x="2258280" y="3580200"/>
-            <a:ext cx="563400" cy="695520"/>
+            <a:off x="493200" y="4591440"/>
+            <a:ext cx="2504880" cy="1458000"/>
           </a:xfrm>
           <a:prstGeom prst="rect">
             <a:avLst/>
@@ -5146,241 +5415,6 @@
           </a:ln>
         </p:spPr>
       </p:pic>
-      <p:sp>
-        <p:nvSpPr>
-          <p:cNvPr id="121" name="CustomShape 5"/>
-          <p:cNvSpPr/>
-          <p:nvPr/>
-        </p:nvSpPr>
-        <p:spPr>
-          <a:xfrm>
-            <a:off x="444600" y="4272840"/>
-            <a:ext cx="963720" cy="363960"/>
-          </a:xfrm>
-          <a:prstGeom prst="rect">
-            <a:avLst/>
-          </a:prstGeom>
-          <a:noFill/>
-          <a:ln>
-            <a:noFill/>
-          </a:ln>
-        </p:spPr>
-        <p:txBody>
-          <a:bodyPr wrap="none" lIns="90000" rIns="90000" tIns="45000" bIns="45000"/>
-          <a:p>
-            <a:pPr>
-              <a:lnSpc>
-                <a:spcPct val="100000"/>
-              </a:lnSpc>
-            </a:pPr>
-            <a:r>
-              <a:rPr lang="en-US">
-                <a:solidFill>
-                  <a:srgbClr val="000000"/>
-                </a:solidFill>
-                <a:latin typeface="Calibri"/>
-              </a:rPr>
-              <a:t>1 Point</a:t>
-            </a:r>
-            <a:endParaRPr/>
-          </a:p>
-        </p:txBody>
-      </p:sp>
-      <p:sp>
-        <p:nvSpPr>
-          <p:cNvPr id="122" name="CustomShape 6"/>
-          <p:cNvSpPr/>
-          <p:nvPr/>
-        </p:nvSpPr>
-        <p:spPr>
-          <a:xfrm>
-            <a:off x="1629000" y="4266360"/>
-            <a:ext cx="1276200" cy="363960"/>
-          </a:xfrm>
-          <a:prstGeom prst="rect">
-            <a:avLst/>
-          </a:prstGeom>
-          <a:noFill/>
-          <a:ln>
-            <a:noFill/>
-          </a:ln>
-        </p:spPr>
-        <p:txBody>
-          <a:bodyPr wrap="none" lIns="90000" rIns="90000" tIns="45000" bIns="45000"/>
-          <a:p>
-            <a:pPr>
-              <a:lnSpc>
-                <a:spcPct val="100000"/>
-              </a:lnSpc>
-            </a:pPr>
-            <a:r>
-              <a:rPr lang="en-US">
-                <a:solidFill>
-                  <a:srgbClr val="000000"/>
-                </a:solidFill>
-                <a:latin typeface="Calibri"/>
-              </a:rPr>
-              <a:t>-2 Points</a:t>
-            </a:r>
-            <a:endParaRPr/>
-          </a:p>
-        </p:txBody>
-      </p:sp>
-      <p:sp>
-        <p:nvSpPr>
-          <p:cNvPr id="123" name="CustomShape 7"/>
-          <p:cNvSpPr/>
-          <p:nvPr/>
-        </p:nvSpPr>
-        <p:spPr>
-          <a:xfrm>
-            <a:off x="333000" y="1425240"/>
-            <a:ext cx="3762360" cy="2284200"/>
-          </a:xfrm>
-          <a:prstGeom prst="rect">
-            <a:avLst/>
-          </a:prstGeom>
-          <a:noFill/>
-          <a:ln>
-            <a:noFill/>
-          </a:ln>
-        </p:spPr>
-        <p:txBody>
-          <a:bodyPr lIns="90000" rIns="90000" tIns="45000" bIns="45000"/>
-          <a:p>
-            <a:pPr>
-              <a:lnSpc>
-                <a:spcPct val="100000"/>
-              </a:lnSpc>
-            </a:pPr>
-            <a:r>
-              <a:rPr lang="en-US">
-                <a:solidFill>
-                  <a:srgbClr val="000000"/>
-                </a:solidFill>
-                <a:latin typeface="Comic Sans MS"/>
-              </a:rPr>
-              <a:t>Counting points!</a:t>
-            </a:r>
-            <a:endParaRPr/>
-          </a:p>
-          <a:p>
-            <a:pPr>
-              <a:lnSpc>
-                <a:spcPct val="100000"/>
-              </a:lnSpc>
-            </a:pPr>
-            <a:endParaRPr/>
-          </a:p>
-          <a:p>
-            <a:pPr>
-              <a:lnSpc>
-                <a:spcPct val="100000"/>
-              </a:lnSpc>
-            </a:pPr>
-            <a:r>
-              <a:rPr lang="en-US">
-                <a:solidFill>
-                  <a:srgbClr val="000000"/>
-                </a:solidFill>
-                <a:latin typeface="Comic Sans MS"/>
-              </a:rPr>
-              <a:t>Make a data element with the name 'score'. </a:t>
-            </a:r>
-            <a:endParaRPr/>
-          </a:p>
-          <a:p>
-            <a:pPr>
-              <a:lnSpc>
-                <a:spcPct val="100000"/>
-              </a:lnSpc>
-            </a:pPr>
-            <a:endParaRPr/>
-          </a:p>
-          <a:p>
-            <a:pPr>
-              <a:lnSpc>
-                <a:spcPct val="100000"/>
-              </a:lnSpc>
-            </a:pPr>
-            <a:r>
-              <a:rPr lang="en-US">
-                <a:solidFill>
-                  <a:srgbClr val="000000"/>
-                </a:solidFill>
-                <a:latin typeface="Comic Sans MS"/>
-              </a:rPr>
-              <a:t>The score will be visible on the screen, with the following code the score will start at 0</a:t>
-            </a:r>
-            <a:endParaRPr/>
-          </a:p>
-        </p:txBody>
-      </p:sp>
-      <p:sp>
-        <p:nvSpPr>
-          <p:cNvPr id="124" name="CustomShape 8"/>
-          <p:cNvSpPr/>
-          <p:nvPr/>
-        </p:nvSpPr>
-        <p:spPr>
-          <a:xfrm>
-            <a:off x="3926880" y="5008680"/>
-            <a:ext cx="4670280" cy="912600"/>
-          </a:xfrm>
-          <a:prstGeom prst="rect">
-            <a:avLst/>
-          </a:prstGeom>
-          <a:noFill/>
-          <a:ln>
-            <a:noFill/>
-          </a:ln>
-        </p:spPr>
-        <p:txBody>
-          <a:bodyPr wrap="none" lIns="90000" rIns="90000" tIns="45000" bIns="45000"/>
-          <a:p>
-            <a:pPr>
-              <a:lnSpc>
-                <a:spcPct val="100000"/>
-              </a:lnSpc>
-            </a:pPr>
-            <a:r>
-              <a:rPr lang="en-US">
-                <a:solidFill>
-                  <a:srgbClr val="000000"/>
-                </a:solidFill>
-                <a:latin typeface="Calibri"/>
-              </a:rPr>
-              <a:t>The Balloon pop game is almost ready!</a:t>
-            </a:r>
-            <a:endParaRPr/>
-          </a:p>
-          <a:p>
-            <a:pPr>
-              <a:lnSpc>
-                <a:spcPct val="100000"/>
-              </a:lnSpc>
-            </a:pPr>
-            <a:endParaRPr/>
-          </a:p>
-          <a:p>
-            <a:pPr>
-              <a:lnSpc>
-                <a:spcPct val="100000"/>
-              </a:lnSpc>
-            </a:pPr>
-            <a:r>
-              <a:rPr lang="en-US">
-                <a:solidFill>
-                  <a:srgbClr val="000000"/>
-                </a:solidFill>
-                <a:latin typeface="Calibri"/>
-              </a:rPr>
-              <a:t>Lets implement counting the points</a:t>
-            </a:r>
-            <a:endParaRPr/>
-          </a:p>
-        </p:txBody>
-      </p:sp>
     </p:spTree>
   </p:cSld>
   <p:timing>
@@ -5432,14 +5466,14 @@
       </p:grpSpPr>
       <p:sp>
         <p:nvSpPr>
-          <p:cNvPr id="125" name="CustomShape 1"/>
+          <p:cNvPr id="126" name="CustomShape 1"/>
           <p:cNvSpPr/>
           <p:nvPr/>
         </p:nvSpPr>
         <p:spPr>
           <a:xfrm>
             <a:off x="457200" y="274680"/>
-            <a:ext cx="8228160" cy="1141560"/>
+            <a:ext cx="8227800" cy="1141200"/>
           </a:xfrm>
           <a:prstGeom prst="rect">
             <a:avLst/>
@@ -5472,14 +5506,14 @@
       </p:sp>
       <p:sp>
         <p:nvSpPr>
-          <p:cNvPr id="126" name="CustomShape 2"/>
+          <p:cNvPr id="127" name="CustomShape 2"/>
           <p:cNvSpPr/>
           <p:nvPr/>
         </p:nvSpPr>
         <p:spPr>
           <a:xfrm>
             <a:off x="532080" y="1417320"/>
-            <a:ext cx="3506040" cy="4433760"/>
+            <a:ext cx="3505680" cy="4433400"/>
           </a:xfrm>
           <a:prstGeom prst="rect">
             <a:avLst/>
@@ -5492,14 +5526,14 @@
       </p:sp>
       <p:sp>
         <p:nvSpPr>
-          <p:cNvPr id="127" name="CustomShape 3"/>
+          <p:cNvPr id="128" name="CustomShape 3"/>
           <p:cNvSpPr/>
           <p:nvPr/>
         </p:nvSpPr>
         <p:spPr>
           <a:xfrm>
             <a:off x="6553440" y="6356520"/>
-            <a:ext cx="2132640" cy="363960"/>
+            <a:ext cx="2132280" cy="363600"/>
           </a:xfrm>
           <a:prstGeom prst="rect">
             <a:avLst/>
@@ -5517,7 +5551,7 @@
                 <a:spcPct val="100000"/>
               </a:lnSpc>
             </a:pPr>
-            <a:fld id="{07BB603A-4E1E-417B-8910-686141B283E8}" type="slidenum">
+            <a:fld id="{E6210843-E420-4486-B76C-21B8ED3D6367}" type="slidenum">
               <a:rPr lang="en-US">
                 <a:solidFill>
                   <a:srgbClr val="000000"/>
@@ -5532,14 +5566,14 @@
       </p:sp>
       <p:sp>
         <p:nvSpPr>
-          <p:cNvPr id="128" name="CustomShape 4"/>
+          <p:cNvPr id="129" name="CustomShape 4"/>
           <p:cNvSpPr/>
           <p:nvPr/>
         </p:nvSpPr>
         <p:spPr>
           <a:xfrm>
             <a:off x="3124440" y="6356520"/>
-            <a:ext cx="2894400" cy="363960"/>
+            <a:ext cx="2894040" cy="363600"/>
           </a:xfrm>
           <a:prstGeom prst="rect">
             <a:avLst/>
@@ -5570,9 +5604,89 @@
           </a:p>
         </p:txBody>
       </p:sp>
+      <p:sp>
+        <p:nvSpPr>
+          <p:cNvPr id="130" name="CustomShape 5"/>
+          <p:cNvSpPr/>
+          <p:nvPr/>
+        </p:nvSpPr>
+        <p:spPr>
+          <a:xfrm>
+            <a:off x="1458720" y="1578960"/>
+            <a:ext cx="4695120" cy="363600"/>
+          </a:xfrm>
+          <a:prstGeom prst="rect">
+            <a:avLst/>
+          </a:prstGeom>
+          <a:noFill/>
+          <a:ln>
+            <a:noFill/>
+          </a:ln>
+        </p:spPr>
+        <p:txBody>
+          <a:bodyPr lIns="90000" rIns="90000" tIns="45000" bIns="45000"/>
+          <a:p>
+            <a:pPr>
+              <a:lnSpc>
+                <a:spcPct val="100000"/>
+              </a:lnSpc>
+            </a:pPr>
+            <a:r>
+              <a:rPr lang="en-US">
+                <a:solidFill>
+                  <a:srgbClr val="000000"/>
+                </a:solidFill>
+                <a:latin typeface="Comic Sans MS"/>
+              </a:rPr>
+              <a:t>Lets set a nice background</a:t>
+            </a:r>
+            <a:endParaRPr/>
+          </a:p>
+        </p:txBody>
+      </p:sp>
+      <p:sp>
+        <p:nvSpPr>
+          <p:cNvPr id="131" name="CustomShape 6"/>
+          <p:cNvSpPr/>
+          <p:nvPr/>
+        </p:nvSpPr>
+        <p:spPr>
+          <a:xfrm>
+            <a:off x="1567080" y="2377440"/>
+            <a:ext cx="2624400" cy="363600"/>
+          </a:xfrm>
+          <a:prstGeom prst="rect">
+            <a:avLst/>
+          </a:prstGeom>
+          <a:noFill/>
+          <a:ln>
+            <a:noFill/>
+          </a:ln>
+        </p:spPr>
+        <p:txBody>
+          <a:bodyPr wrap="none" lIns="90000" rIns="90000" tIns="45000" bIns="45000"/>
+          <a:p>
+            <a:pPr>
+              <a:lnSpc>
+                <a:spcPct val="100000"/>
+              </a:lnSpc>
+            </a:pPr>
+            <a:r>
+              <a:rPr lang="en-US">
+                <a:solidFill>
+                  <a:srgbClr val="000000"/>
+                </a:solidFill>
+                <a:latin typeface="Comic Sans MS"/>
+              </a:rPr>
+              <a:t>There is enough choice</a:t>
+            </a:r>
+            <a:endParaRPr/>
+          </a:p>
+        </p:txBody>
+      </p:sp>
       <p:pic>
         <p:nvPicPr>
-          <p:cNvPr id="129" name="Afbeelding 2" descr=""/>
+          <p:cNvPr id="132" name="Afbeelding 9" descr=""/>
           <p:cNvPicPr/>
           <p:nvPr/>
         </p:nvPicPr>
@@ -5584,8 +5698,8 @@
         </p:blipFill>
         <p:spPr>
           <a:xfrm>
-            <a:off x="407880" y="1533600"/>
-            <a:ext cx="1014840" cy="1789560"/>
+            <a:off x="4892400" y="2428560"/>
+            <a:ext cx="3792960" cy="2898360"/>
           </a:xfrm>
           <a:prstGeom prst="rect">
             <a:avLst/>
@@ -5597,14 +5711,14 @@
       </p:pic>
       <p:sp>
         <p:nvSpPr>
-          <p:cNvPr id="130" name="CustomShape 5"/>
+          <p:cNvPr id="133" name="CustomShape 7"/>
           <p:cNvSpPr/>
           <p:nvPr/>
         </p:nvSpPr>
         <p:spPr>
           <a:xfrm>
-            <a:off x="1458720" y="1578960"/>
-            <a:ext cx="4695480" cy="363960"/>
+            <a:off x="49320" y="3835800"/>
+            <a:ext cx="4839840" cy="2558160"/>
           </a:xfrm>
           <a:prstGeom prst="rect">
             <a:avLst/>
@@ -5615,7 +5729,7 @@
           </a:ln>
         </p:spPr>
         <p:txBody>
-          <a:bodyPr lIns="90000" rIns="90000" tIns="45000" bIns="45000"/>
+          <a:bodyPr wrap="none" lIns="90000" rIns="90000" tIns="45000" bIns="45000"/>
           <a:p>
             <a:pPr>
               <a:lnSpc>
@@ -5629,33 +5743,18 @@
                 </a:solidFill>
                 <a:latin typeface="Comic Sans MS"/>
               </a:rPr>
-              <a:t>Lets set a nice background</a:t>
-            </a:r>
-            <a:endParaRPr/>
-          </a:p>
-        </p:txBody>
-      </p:sp>
-      <p:sp>
-        <p:nvSpPr>
-          <p:cNvPr id="131" name="CustomShape 6"/>
-          <p:cNvSpPr/>
-          <p:nvPr/>
-        </p:nvSpPr>
-        <p:spPr>
-          <a:xfrm>
-            <a:off x="1567080" y="2377440"/>
-            <a:ext cx="2624760" cy="363960"/>
-          </a:xfrm>
-          <a:prstGeom prst="rect">
-            <a:avLst/>
-          </a:prstGeom>
-          <a:noFill/>
-          <a:ln>
-            <a:noFill/>
-          </a:ln>
-        </p:spPr>
-        <p:txBody>
-          <a:bodyPr wrap="none" lIns="90000" rIns="90000" tIns="45000" bIns="45000"/>
+              <a:t>Finished?</a:t>
+            </a:r>
+            <a:endParaRPr/>
+          </a:p>
+          <a:p>
+            <a:pPr>
+              <a:lnSpc>
+                <a:spcPct val="100000"/>
+              </a:lnSpc>
+            </a:pPr>
+            <a:endParaRPr/>
+          </a:p>
           <a:p>
             <a:pPr>
               <a:lnSpc>
@@ -5669,58 +5768,10 @@
                 </a:solidFill>
                 <a:latin typeface="Comic Sans MS"/>
               </a:rPr>
-              <a:t>There is enough choice</a:t>
-            </a:r>
-            <a:endParaRPr/>
-          </a:p>
-        </p:txBody>
-      </p:sp>
-      <p:pic>
-        <p:nvPicPr>
-          <p:cNvPr id="132" name="Afbeelding 9" descr=""/>
-          <p:cNvPicPr/>
-          <p:nvPr/>
-        </p:nvPicPr>
-        <p:blipFill>
-          <a:blip r:embed="rId2"/>
-          <a:stretch>
-            <a:fillRect/>
-          </a:stretch>
-        </p:blipFill>
-        <p:spPr>
-          <a:xfrm>
-            <a:off x="4892400" y="2428560"/>
-            <a:ext cx="3793320" cy="2898720"/>
-          </a:xfrm>
-          <a:prstGeom prst="rect">
-            <a:avLst/>
-          </a:prstGeom>
-          <a:ln>
-            <a:noFill/>
-          </a:ln>
-        </p:spPr>
-      </p:pic>
-      <p:sp>
-        <p:nvSpPr>
-          <p:cNvPr id="133" name="CustomShape 7"/>
-          <p:cNvSpPr/>
-          <p:nvPr/>
-        </p:nvSpPr>
-        <p:spPr>
-          <a:xfrm>
-            <a:off x="49320" y="3835800"/>
-            <a:ext cx="4840200" cy="2558520"/>
-          </a:xfrm>
-          <a:prstGeom prst="rect">
-            <a:avLst/>
-          </a:prstGeom>
-          <a:noFill/>
-          <a:ln>
-            <a:noFill/>
-          </a:ln>
-        </p:spPr>
-        <p:txBody>
-          <a:bodyPr wrap="none" lIns="90000" rIns="90000" tIns="45000" bIns="45000"/>
+              <a:t>What things do you like to add to</a:t>
+            </a:r>
+            <a:endParaRPr/>
+          </a:p>
           <a:p>
             <a:pPr>
               <a:lnSpc>
@@ -5734,16 +5785,8 @@
                 </a:solidFill>
                 <a:latin typeface="Comic Sans MS"/>
               </a:rPr>
-              <a:t>Finished?</a:t>
-            </a:r>
-            <a:endParaRPr/>
-          </a:p>
-          <a:p>
-            <a:pPr>
-              <a:lnSpc>
-                <a:spcPct val="100000"/>
-              </a:lnSpc>
-            </a:pPr>
+              <a:t>make the game more fun or more difficult.</a:t>
+            </a:r>
             <a:endParaRPr/>
           </a:p>
           <a:p>
@@ -5759,15 +5802,18 @@
                 </a:solidFill>
                 <a:latin typeface="Comic Sans MS"/>
               </a:rPr>
-              <a:t>What things do you like to add to</a:t>
-            </a:r>
-            <a:endParaRPr/>
-          </a:p>
-          <a:p>
-            <a:pPr>
-              <a:lnSpc>
-                <a:spcPct val="100000"/>
-              </a:lnSpc>
+              <a:t>Think about things like:</a:t>
+            </a:r>
+            <a:endParaRPr/>
+          </a:p>
+          <a:p>
+            <a:pPr>
+              <a:lnSpc>
+                <a:spcPct val="100000"/>
+              </a:lnSpc>
+              <a:buBlip>
+                <a:blip r:embed="rId2"/>
+              </a:buBlip>
             </a:pPr>
             <a:r>
               <a:rPr lang="en-US">
@@ -5776,15 +5822,18 @@
                 </a:solidFill>
                 <a:latin typeface="Comic Sans MS"/>
               </a:rPr>
-              <a:t>make the game more fun or more difficult.</a:t>
-            </a:r>
-            <a:endParaRPr/>
-          </a:p>
-          <a:p>
-            <a:pPr>
-              <a:lnSpc>
-                <a:spcPct val="100000"/>
-              </a:lnSpc>
+              <a:t>Smaller balloons</a:t>
+            </a:r>
+            <a:endParaRPr/>
+          </a:p>
+          <a:p>
+            <a:pPr>
+              <a:lnSpc>
+                <a:spcPct val="100000"/>
+              </a:lnSpc>
+              <a:buBlip>
+                <a:blip r:embed="rId3"/>
+              </a:buBlip>
             </a:pPr>
             <a:r>
               <a:rPr lang="en-US">
@@ -5793,7 +5842,7 @@
                 </a:solidFill>
                 <a:latin typeface="Comic Sans MS"/>
               </a:rPr>
-              <a:t>Think about things like:</a:t>
+              <a:t>Speed</a:t>
             </a:r>
             <a:endParaRPr/>
           </a:p>
@@ -5803,7 +5852,7 @@
                 <a:spcPct val="100000"/>
               </a:lnSpc>
               <a:buBlip>
-                <a:blip r:embed="rId3"/>
+                <a:blip r:embed="rId4"/>
               </a:buBlip>
             </a:pPr>
             <a:r>
@@ -5813,46 +5862,6 @@
                 </a:solidFill>
                 <a:latin typeface="Comic Sans MS"/>
               </a:rPr>
-              <a:t>Smaller balloons</a:t>
-            </a:r>
-            <a:endParaRPr/>
-          </a:p>
-          <a:p>
-            <a:pPr>
-              <a:lnSpc>
-                <a:spcPct val="100000"/>
-              </a:lnSpc>
-              <a:buBlip>
-                <a:blip r:embed="rId4"/>
-              </a:buBlip>
-            </a:pPr>
-            <a:r>
-              <a:rPr lang="en-US">
-                <a:solidFill>
-                  <a:srgbClr val="000000"/>
-                </a:solidFill>
-                <a:latin typeface="Comic Sans MS"/>
-              </a:rPr>
-              <a:t>Speed</a:t>
-            </a:r>
-            <a:endParaRPr/>
-          </a:p>
-          <a:p>
-            <a:pPr>
-              <a:lnSpc>
-                <a:spcPct val="100000"/>
-              </a:lnSpc>
-              <a:buBlip>
-                <a:blip r:embed="rId5"/>
-              </a:buBlip>
-            </a:pPr>
-            <a:r>
-              <a:rPr lang="en-US">
-                <a:solidFill>
-                  <a:srgbClr val="000000"/>
-                </a:solidFill>
-                <a:latin typeface="Comic Sans MS"/>
-              </a:rPr>
               <a:t>Sideways movement of the balloons.</a:t>
             </a:r>
             <a:endParaRPr/>
@@ -5870,6 +5879,31 @@
       <p:pic>
         <p:nvPicPr>
           <p:cNvPr id="134" name="" descr=""/>
+          <p:cNvPicPr/>
+          <p:nvPr/>
+        </p:nvPicPr>
+        <p:blipFill>
+          <a:blip r:embed="rId5"/>
+          <a:stretch>
+            <a:fillRect/>
+          </a:stretch>
+        </p:blipFill>
+        <p:spPr>
+          <a:xfrm>
+            <a:off x="4190760" y="5259600"/>
+            <a:ext cx="572760" cy="1095120"/>
+          </a:xfrm>
+          <a:prstGeom prst="rect">
+            <a:avLst/>
+          </a:prstGeom>
+          <a:ln>
+            <a:noFill/>
+          </a:ln>
+        </p:spPr>
+      </p:pic>
+      <p:pic>
+        <p:nvPicPr>
+          <p:cNvPr id="135" name="" descr=""/>
           <p:cNvPicPr/>
           <p:nvPr/>
         </p:nvPicPr>
@@ -5881,8 +5915,8 @@
         </p:blipFill>
         <p:spPr>
           <a:xfrm>
-            <a:off x="4190760" y="5259600"/>
-            <a:ext cx="573120" cy="1095480"/>
+            <a:off x="503280" y="1531800"/>
+            <a:ext cx="959760" cy="1809720"/>
           </a:xfrm>
           <a:prstGeom prst="rect">
             <a:avLst/>

</xml_diff>